<commit_message>
Tweaked writeup in implementation and fixed small error in diagram
</commit_message>
<xml_diff>
--- a/docs/diagrams/UiComponentClassDiagram.pptx
+++ b/docs/diagrams/UiComponentClassDiagram.pptx
@@ -176,7 +176,7 @@
             </a:lvl1pPr>
           </a:lstStyle>
           <a:p>
-            <a:endParaRPr lang="en-US"/>
+            <a:endParaRPr lang="en-US" dirty="0"/>
           </a:p>
         </p:txBody>
       </p:sp>
@@ -209,9 +209,9 @@
           <a:p>
             <a:fld id="{F5CC4B3F-88C1-4FFA-B1B6-F41C21DC6924}" type="datetimeFigureOut">
               <a:rPr lang="en-US" smtClean="0"/>
-              <a:t>11/6/18</a:t>
+              <a:t>11/7/18</a:t>
             </a:fld>
-            <a:endParaRPr lang="en-US"/>
+            <a:endParaRPr lang="en-US" dirty="0"/>
           </a:p>
         </p:txBody>
       </p:sp>
@@ -244,7 +244,7 @@
           <a:bodyPr vert="horz" lIns="91440" tIns="45720" rIns="91440" bIns="45720" rtlCol="0" anchor="ctr"/>
           <a:lstStyle/>
           <a:p>
-            <a:endParaRPr lang="en-US"/>
+            <a:endParaRPr lang="en-US" dirty="0"/>
           </a:p>
         </p:txBody>
       </p:sp>
@@ -334,7 +334,7 @@
             </a:lvl1pPr>
           </a:lstStyle>
           <a:p>
-            <a:endParaRPr lang="en-US"/>
+            <a:endParaRPr lang="en-US" dirty="0"/>
           </a:p>
         </p:txBody>
       </p:sp>
@@ -369,7 +369,7 @@
               <a:rPr lang="en-US" smtClean="0"/>
               <a:t>‹#›</a:t>
             </a:fld>
-            <a:endParaRPr lang="en-US"/>
+            <a:endParaRPr lang="en-US" dirty="0"/>
           </a:p>
         </p:txBody>
       </p:sp>
@@ -543,7 +543,7 @@
               <a:rPr lang="en-US" smtClean="0"/>
               <a:t>2</a:t>
             </a:fld>
-            <a:endParaRPr lang="en-US"/>
+            <a:endParaRPr lang="en-US" dirty="0"/>
           </a:p>
         </p:txBody>
       </p:sp>
@@ -739,9 +739,9 @@
           <a:p>
             <a:fld id="{78C97017-6FC3-485B-9764-EAC9E56C1D49}" type="datetimeFigureOut">
               <a:rPr lang="en-US" smtClean="0"/>
-              <a:t>11/6/18</a:t>
+              <a:t>11/7/18</a:t>
             </a:fld>
-            <a:endParaRPr lang="en-US"/>
+            <a:endParaRPr lang="en-US" dirty="0"/>
           </a:p>
         </p:txBody>
       </p:sp>
@@ -760,7 +760,7 @@
           <a:bodyPr/>
           <a:lstStyle/>
           <a:p>
-            <a:endParaRPr lang="en-US"/>
+            <a:endParaRPr lang="en-US" dirty="0"/>
           </a:p>
         </p:txBody>
       </p:sp>
@@ -783,7 +783,7 @@
               <a:rPr lang="en-US" smtClean="0"/>
               <a:t>‹#›</a:t>
             </a:fld>
-            <a:endParaRPr lang="en-US"/>
+            <a:endParaRPr lang="en-US" dirty="0"/>
           </a:p>
         </p:txBody>
       </p:sp>
@@ -907,9 +907,9 @@
           <a:p>
             <a:fld id="{78C97017-6FC3-485B-9764-EAC9E56C1D49}" type="datetimeFigureOut">
               <a:rPr lang="en-US" smtClean="0"/>
-              <a:t>11/6/18</a:t>
+              <a:t>11/7/18</a:t>
             </a:fld>
-            <a:endParaRPr lang="en-US"/>
+            <a:endParaRPr lang="en-US" dirty="0"/>
           </a:p>
         </p:txBody>
       </p:sp>
@@ -928,7 +928,7 @@
           <a:bodyPr/>
           <a:lstStyle/>
           <a:p>
-            <a:endParaRPr lang="en-US"/>
+            <a:endParaRPr lang="en-US" dirty="0"/>
           </a:p>
         </p:txBody>
       </p:sp>
@@ -951,7 +951,7 @@
               <a:rPr lang="en-US" smtClean="0"/>
               <a:t>‹#›</a:t>
             </a:fld>
-            <a:endParaRPr lang="en-US"/>
+            <a:endParaRPr lang="en-US" dirty="0"/>
           </a:p>
         </p:txBody>
       </p:sp>
@@ -1085,9 +1085,9 @@
           <a:p>
             <a:fld id="{78C97017-6FC3-485B-9764-EAC9E56C1D49}" type="datetimeFigureOut">
               <a:rPr lang="en-US" smtClean="0"/>
-              <a:t>11/6/18</a:t>
+              <a:t>11/7/18</a:t>
             </a:fld>
-            <a:endParaRPr lang="en-US"/>
+            <a:endParaRPr lang="en-US" dirty="0"/>
           </a:p>
         </p:txBody>
       </p:sp>
@@ -1106,7 +1106,7 @@
           <a:bodyPr/>
           <a:lstStyle/>
           <a:p>
-            <a:endParaRPr lang="en-US"/>
+            <a:endParaRPr lang="en-US" dirty="0"/>
           </a:p>
         </p:txBody>
       </p:sp>
@@ -1129,7 +1129,7 @@
               <a:rPr lang="en-US" smtClean="0"/>
               <a:t>‹#›</a:t>
             </a:fld>
-            <a:endParaRPr lang="en-US"/>
+            <a:endParaRPr lang="en-US" dirty="0"/>
           </a:p>
         </p:txBody>
       </p:sp>
@@ -1253,9 +1253,9 @@
           <a:p>
             <a:fld id="{78C97017-6FC3-485B-9764-EAC9E56C1D49}" type="datetimeFigureOut">
               <a:rPr lang="en-US" smtClean="0"/>
-              <a:t>11/6/18</a:t>
+              <a:t>11/7/18</a:t>
             </a:fld>
-            <a:endParaRPr lang="en-US"/>
+            <a:endParaRPr lang="en-US" dirty="0"/>
           </a:p>
         </p:txBody>
       </p:sp>
@@ -1274,7 +1274,7 @@
           <a:bodyPr/>
           <a:lstStyle/>
           <a:p>
-            <a:endParaRPr lang="en-US"/>
+            <a:endParaRPr lang="en-US" dirty="0"/>
           </a:p>
         </p:txBody>
       </p:sp>
@@ -1297,7 +1297,7 @@
               <a:rPr lang="en-US" smtClean="0"/>
               <a:t>‹#›</a:t>
             </a:fld>
-            <a:endParaRPr lang="en-US"/>
+            <a:endParaRPr lang="en-US" dirty="0"/>
           </a:p>
         </p:txBody>
       </p:sp>
@@ -1498,9 +1498,9 @@
           <a:p>
             <a:fld id="{78C97017-6FC3-485B-9764-EAC9E56C1D49}" type="datetimeFigureOut">
               <a:rPr lang="en-US" smtClean="0"/>
-              <a:t>11/6/18</a:t>
+              <a:t>11/7/18</a:t>
             </a:fld>
-            <a:endParaRPr lang="en-US"/>
+            <a:endParaRPr lang="en-US" dirty="0"/>
           </a:p>
         </p:txBody>
       </p:sp>
@@ -1519,7 +1519,7 @@
           <a:bodyPr/>
           <a:lstStyle/>
           <a:p>
-            <a:endParaRPr lang="en-US"/>
+            <a:endParaRPr lang="en-US" dirty="0"/>
           </a:p>
         </p:txBody>
       </p:sp>
@@ -1542,7 +1542,7 @@
               <a:rPr lang="en-US" smtClean="0"/>
               <a:t>‹#›</a:t>
             </a:fld>
-            <a:endParaRPr lang="en-US"/>
+            <a:endParaRPr lang="en-US" dirty="0"/>
           </a:p>
         </p:txBody>
       </p:sp>
@@ -1783,9 +1783,9 @@
           <a:p>
             <a:fld id="{78C97017-6FC3-485B-9764-EAC9E56C1D49}" type="datetimeFigureOut">
               <a:rPr lang="en-US" smtClean="0"/>
-              <a:t>11/6/18</a:t>
+              <a:t>11/7/18</a:t>
             </a:fld>
-            <a:endParaRPr lang="en-US"/>
+            <a:endParaRPr lang="en-US" dirty="0"/>
           </a:p>
         </p:txBody>
       </p:sp>
@@ -1804,7 +1804,7 @@
           <a:bodyPr/>
           <a:lstStyle/>
           <a:p>
-            <a:endParaRPr lang="en-US"/>
+            <a:endParaRPr lang="en-US" dirty="0"/>
           </a:p>
         </p:txBody>
       </p:sp>
@@ -1827,7 +1827,7 @@
               <a:rPr lang="en-US" smtClean="0"/>
               <a:t>‹#›</a:t>
             </a:fld>
-            <a:endParaRPr lang="en-US"/>
+            <a:endParaRPr lang="en-US" dirty="0"/>
           </a:p>
         </p:txBody>
       </p:sp>
@@ -2202,9 +2202,9 @@
           <a:p>
             <a:fld id="{78C97017-6FC3-485B-9764-EAC9E56C1D49}" type="datetimeFigureOut">
               <a:rPr lang="en-US" smtClean="0"/>
-              <a:t>11/6/18</a:t>
+              <a:t>11/7/18</a:t>
             </a:fld>
-            <a:endParaRPr lang="en-US"/>
+            <a:endParaRPr lang="en-US" dirty="0"/>
           </a:p>
         </p:txBody>
       </p:sp>
@@ -2223,7 +2223,7 @@
           <a:bodyPr/>
           <a:lstStyle/>
           <a:p>
-            <a:endParaRPr lang="en-US"/>
+            <a:endParaRPr lang="en-US" dirty="0"/>
           </a:p>
         </p:txBody>
       </p:sp>
@@ -2246,7 +2246,7 @@
               <a:rPr lang="en-US" smtClean="0"/>
               <a:t>‹#›</a:t>
             </a:fld>
-            <a:endParaRPr lang="en-US"/>
+            <a:endParaRPr lang="en-US" dirty="0"/>
           </a:p>
         </p:txBody>
       </p:sp>
@@ -2319,9 +2319,9 @@
           <a:p>
             <a:fld id="{78C97017-6FC3-485B-9764-EAC9E56C1D49}" type="datetimeFigureOut">
               <a:rPr lang="en-US" smtClean="0"/>
-              <a:t>11/6/18</a:t>
+              <a:t>11/7/18</a:t>
             </a:fld>
-            <a:endParaRPr lang="en-US"/>
+            <a:endParaRPr lang="en-US" dirty="0"/>
           </a:p>
         </p:txBody>
       </p:sp>
@@ -2340,7 +2340,7 @@
           <a:bodyPr/>
           <a:lstStyle/>
           <a:p>
-            <a:endParaRPr lang="en-US"/>
+            <a:endParaRPr lang="en-US" dirty="0"/>
           </a:p>
         </p:txBody>
       </p:sp>
@@ -2363,7 +2363,7 @@
               <a:rPr lang="en-US" smtClean="0"/>
               <a:t>‹#›</a:t>
             </a:fld>
-            <a:endParaRPr lang="en-US"/>
+            <a:endParaRPr lang="en-US" dirty="0"/>
           </a:p>
         </p:txBody>
       </p:sp>
@@ -2414,9 +2414,9 @@
           <a:p>
             <a:fld id="{78C97017-6FC3-485B-9764-EAC9E56C1D49}" type="datetimeFigureOut">
               <a:rPr lang="en-US" smtClean="0"/>
-              <a:t>11/6/18</a:t>
+              <a:t>11/7/18</a:t>
             </a:fld>
-            <a:endParaRPr lang="en-US"/>
+            <a:endParaRPr lang="en-US" dirty="0"/>
           </a:p>
         </p:txBody>
       </p:sp>
@@ -2435,7 +2435,7 @@
           <a:bodyPr/>
           <a:lstStyle/>
           <a:p>
-            <a:endParaRPr lang="en-US"/>
+            <a:endParaRPr lang="en-US" dirty="0"/>
           </a:p>
         </p:txBody>
       </p:sp>
@@ -2458,7 +2458,7 @@
               <a:rPr lang="en-US" smtClean="0"/>
               <a:t>‹#›</a:t>
             </a:fld>
-            <a:endParaRPr lang="en-US"/>
+            <a:endParaRPr lang="en-US" dirty="0"/>
           </a:p>
         </p:txBody>
       </p:sp>
@@ -2689,9 +2689,9 @@
           <a:p>
             <a:fld id="{78C97017-6FC3-485B-9764-EAC9E56C1D49}" type="datetimeFigureOut">
               <a:rPr lang="en-US" smtClean="0"/>
-              <a:t>11/6/18</a:t>
+              <a:t>11/7/18</a:t>
             </a:fld>
-            <a:endParaRPr lang="en-US"/>
+            <a:endParaRPr lang="en-US" dirty="0"/>
           </a:p>
         </p:txBody>
       </p:sp>
@@ -2710,7 +2710,7 @@
           <a:bodyPr/>
           <a:lstStyle/>
           <a:p>
-            <a:endParaRPr lang="en-US"/>
+            <a:endParaRPr lang="en-US" dirty="0"/>
           </a:p>
         </p:txBody>
       </p:sp>
@@ -2733,7 +2733,7 @@
               <a:rPr lang="en-US" smtClean="0"/>
               <a:t>‹#›</a:t>
             </a:fld>
-            <a:endParaRPr lang="en-US"/>
+            <a:endParaRPr lang="en-US" dirty="0"/>
           </a:p>
         </p:txBody>
       </p:sp>
@@ -2855,7 +2855,7 @@
             </a:lvl9pPr>
           </a:lstStyle>
           <a:p>
-            <a:endParaRPr lang="en-US"/>
+            <a:endParaRPr lang="en-US" dirty="0"/>
           </a:p>
         </p:txBody>
       </p:sp>
@@ -2941,9 +2941,9 @@
           <a:p>
             <a:fld id="{78C97017-6FC3-485B-9764-EAC9E56C1D49}" type="datetimeFigureOut">
               <a:rPr lang="en-US" smtClean="0"/>
-              <a:t>11/6/18</a:t>
+              <a:t>11/7/18</a:t>
             </a:fld>
-            <a:endParaRPr lang="en-US"/>
+            <a:endParaRPr lang="en-US" dirty="0"/>
           </a:p>
         </p:txBody>
       </p:sp>
@@ -2962,7 +2962,7 @@
           <a:bodyPr/>
           <a:lstStyle/>
           <a:p>
-            <a:endParaRPr lang="en-US"/>
+            <a:endParaRPr lang="en-US" dirty="0"/>
           </a:p>
         </p:txBody>
       </p:sp>
@@ -2985,7 +2985,7 @@
               <a:rPr lang="en-US" smtClean="0"/>
               <a:t>‹#›</a:t>
             </a:fld>
-            <a:endParaRPr lang="en-US"/>
+            <a:endParaRPr lang="en-US" dirty="0"/>
           </a:p>
         </p:txBody>
       </p:sp>
@@ -3152,9 +3152,9 @@
           <a:p>
             <a:fld id="{78C97017-6FC3-485B-9764-EAC9E56C1D49}" type="datetimeFigureOut">
               <a:rPr lang="en-US" smtClean="0"/>
-              <a:t>11/6/18</a:t>
+              <a:t>11/7/18</a:t>
             </a:fld>
-            <a:endParaRPr lang="en-US"/>
+            <a:endParaRPr lang="en-US" dirty="0"/>
           </a:p>
         </p:txBody>
       </p:sp>
@@ -3191,7 +3191,7 @@
             </a:lvl1pPr>
           </a:lstStyle>
           <a:p>
-            <a:endParaRPr lang="en-US"/>
+            <a:endParaRPr lang="en-US" dirty="0"/>
           </a:p>
         </p:txBody>
       </p:sp>
@@ -3232,7 +3232,7 @@
               <a:rPr lang="en-US" smtClean="0"/>
               <a:t>‹#›</a:t>
             </a:fld>
-            <a:endParaRPr lang="en-US"/>
+            <a:endParaRPr lang="en-US" dirty="0"/>
           </a:p>
         </p:txBody>
       </p:sp>
@@ -3630,7 +3630,7 @@
           <a:p>
             <a:pPr algn="ctr"/>
             <a:r>
-              <a:rPr lang="en-US" sz="1050" b="1" dirty="0" err="1">
+              <a:rPr lang="en-US" sz="1050" b="1" dirty="0">
                 <a:solidFill>
                   <a:schemeClr val="accent3">
                     <a:lumMod val="75000"/>
@@ -3690,7 +3690,7 @@
           <a:p>
             <a:pPr algn="ctr"/>
             <a:r>
-              <a:rPr lang="en-US" sz="1050" b="1" dirty="0" err="1">
+              <a:rPr lang="en-US" sz="1050" b="1" dirty="0">
                 <a:solidFill>
                   <a:schemeClr val="accent3">
                     <a:lumMod val="75000"/>
@@ -3753,7 +3753,7 @@
           <a:p>
             <a:pPr algn="ctr"/>
             <a:r>
-              <a:rPr lang="en-US" sz="1050" dirty="0" err="1">
+              <a:rPr lang="en-US" sz="1050" dirty="0">
                 <a:solidFill>
                   <a:schemeClr val="bg1"/>
                 </a:solidFill>
@@ -3851,7 +3851,7 @@
           <a:lstStyle/>
           <a:p>
             <a:pPr algn="ctr"/>
-            <a:endParaRPr lang="en-SG" sz="1050" b="1">
+            <a:endParaRPr lang="en-SG" sz="1050" b="1" dirty="0">
               <a:solidFill>
                 <a:srgbClr val="92D050"/>
               </a:solidFill>
@@ -4063,7 +4063,7 @@
           <a:p>
             <a:pPr algn="ctr"/>
             <a:r>
-              <a:rPr lang="en-US" sz="1050" b="1" dirty="0" err="1">
+              <a:rPr lang="en-US" sz="1050" b="1" dirty="0">
                 <a:solidFill>
                   <a:schemeClr val="accent3">
                     <a:lumMod val="75000"/>
@@ -4123,7 +4123,7 @@
           <a:p>
             <a:pPr algn="ctr"/>
             <a:r>
-              <a:rPr lang="en-US" sz="1050" b="1" dirty="0" err="1">
+              <a:rPr lang="en-US" sz="1050" b="1" err="1">
                 <a:solidFill>
                   <a:schemeClr val="accent3">
                     <a:lumMod val="75000"/>
@@ -4132,6 +4132,126 @@
               </a:rPr>
               <a:t>PersonListPanel</a:t>
             </a:r>
+            <a:endParaRPr lang="en-SG" sz="1050" b="1">
+              <a:solidFill>
+                <a:schemeClr val="accent3">
+                  <a:lumMod val="75000"/>
+                </a:schemeClr>
+              </a:solidFill>
+            </a:endParaRPr>
+          </a:p>
+        </p:txBody>
+      </p:sp>
+      <p:sp>
+        <p:nvSpPr>
+          <p:cNvPr id="37" name="Rectangle 11"/>
+          <p:cNvSpPr/>
+          <p:nvPr/>
+        </p:nvSpPr>
+        <p:spPr>
+          <a:xfrm>
+            <a:off x="3839323" y="4228801"/>
+            <a:ext cx="1040906" cy="236841"/>
+          </a:xfrm>
+          <a:prstGeom prst="rect">
+            <a:avLst/>
+          </a:prstGeom>
+          <a:ln w="19050">
+            <a:solidFill>
+              <a:schemeClr val="accent3"/>
+            </a:solidFill>
+          </a:ln>
+          <a:effectLst/>
+        </p:spPr>
+        <p:style>
+          <a:lnRef idx="1">
+            <a:schemeClr val="accent3"/>
+          </a:lnRef>
+          <a:fillRef idx="2">
+            <a:schemeClr val="accent3"/>
+          </a:fillRef>
+          <a:effectRef idx="1">
+            <a:schemeClr val="accent3"/>
+          </a:effectRef>
+          <a:fontRef idx="minor">
+            <a:schemeClr val="dk1"/>
+          </a:fontRef>
+        </p:style>
+        <p:txBody>
+          <a:bodyPr rtlCol="0" anchor="ctr"/>
+          <a:lstStyle/>
+          <a:p>
+            <a:pPr algn="ctr"/>
+            <a:r>
+              <a:rPr lang="en-US" sz="1050" b="1" err="1">
+                <a:solidFill>
+                  <a:schemeClr val="accent3">
+                    <a:lumMod val="75000"/>
+                  </a:schemeClr>
+                </a:solidFill>
+              </a:rPr>
+              <a:t>PersonCard</a:t>
+            </a:r>
+            <a:endParaRPr lang="en-SG" sz="1050" b="1">
+              <a:solidFill>
+                <a:schemeClr val="accent3">
+                  <a:lumMod val="75000"/>
+                </a:schemeClr>
+              </a:solidFill>
+            </a:endParaRPr>
+          </a:p>
+        </p:txBody>
+      </p:sp>
+      <p:sp>
+        <p:nvSpPr>
+          <p:cNvPr id="38" name="Rectangle 11"/>
+          <p:cNvSpPr/>
+          <p:nvPr/>
+        </p:nvSpPr>
+        <p:spPr>
+          <a:xfrm>
+            <a:off x="2592528" y="4966000"/>
+            <a:ext cx="1093635" cy="236841"/>
+          </a:xfrm>
+          <a:prstGeom prst="rect">
+            <a:avLst/>
+          </a:prstGeom>
+          <a:ln w="19050">
+            <a:solidFill>
+              <a:schemeClr val="accent3"/>
+            </a:solidFill>
+          </a:ln>
+          <a:effectLst/>
+        </p:spPr>
+        <p:style>
+          <a:lnRef idx="1">
+            <a:schemeClr val="accent3"/>
+          </a:lnRef>
+          <a:fillRef idx="2">
+            <a:schemeClr val="accent3"/>
+          </a:fillRef>
+          <a:effectRef idx="1">
+            <a:schemeClr val="accent3"/>
+          </a:effectRef>
+          <a:fontRef idx="minor">
+            <a:schemeClr val="dk1"/>
+          </a:fontRef>
+        </p:style>
+        <p:txBody>
+          <a:bodyPr rtlCol="0" anchor="ctr"/>
+          <a:lstStyle/>
+          <a:p>
+            <a:pPr algn="ctr"/>
+            <a:r>
+              <a:rPr lang="en-US" sz="1050" b="1" dirty="0">
+                <a:solidFill>
+                  <a:schemeClr val="accent3">
+                    <a:lumMod val="75000"/>
+                  </a:schemeClr>
+                </a:solidFill>
+              </a:rPr>
+              <a:t>HelpWindow</a:t>
+            </a:r>
             <a:endParaRPr lang="en-SG" sz="1050" b="1" dirty="0">
               <a:solidFill>
                 <a:schemeClr val="accent3">
@@ -4144,126 +4264,6 @@
       </p:sp>
       <p:sp>
         <p:nvSpPr>
-          <p:cNvPr id="37" name="Rectangle 11"/>
-          <p:cNvSpPr/>
-          <p:nvPr/>
-        </p:nvSpPr>
-        <p:spPr>
-          <a:xfrm>
-            <a:off x="3839323" y="4228801"/>
-            <a:ext cx="1040906" cy="236841"/>
-          </a:xfrm>
-          <a:prstGeom prst="rect">
-            <a:avLst/>
-          </a:prstGeom>
-          <a:ln w="19050">
-            <a:solidFill>
-              <a:schemeClr val="accent3"/>
-            </a:solidFill>
-          </a:ln>
-          <a:effectLst/>
-        </p:spPr>
-        <p:style>
-          <a:lnRef idx="1">
-            <a:schemeClr val="accent3"/>
-          </a:lnRef>
-          <a:fillRef idx="2">
-            <a:schemeClr val="accent3"/>
-          </a:fillRef>
-          <a:effectRef idx="1">
-            <a:schemeClr val="accent3"/>
-          </a:effectRef>
-          <a:fontRef idx="minor">
-            <a:schemeClr val="dk1"/>
-          </a:fontRef>
-        </p:style>
-        <p:txBody>
-          <a:bodyPr rtlCol="0" anchor="ctr"/>
-          <a:lstStyle/>
-          <a:p>
-            <a:pPr algn="ctr"/>
-            <a:r>
-              <a:rPr lang="en-US" sz="1050" b="1" dirty="0" err="1">
-                <a:solidFill>
-                  <a:schemeClr val="accent3">
-                    <a:lumMod val="75000"/>
-                  </a:schemeClr>
-                </a:solidFill>
-              </a:rPr>
-              <a:t>PersonCard</a:t>
-            </a:r>
-            <a:endParaRPr lang="en-SG" sz="1050" b="1" dirty="0">
-              <a:solidFill>
-                <a:schemeClr val="accent3">
-                  <a:lumMod val="75000"/>
-                </a:schemeClr>
-              </a:solidFill>
-            </a:endParaRPr>
-          </a:p>
-        </p:txBody>
-      </p:sp>
-      <p:sp>
-        <p:nvSpPr>
-          <p:cNvPr id="38" name="Rectangle 11"/>
-          <p:cNvSpPr/>
-          <p:nvPr/>
-        </p:nvSpPr>
-        <p:spPr>
-          <a:xfrm>
-            <a:off x="2592528" y="4966000"/>
-            <a:ext cx="1093635" cy="236841"/>
-          </a:xfrm>
-          <a:prstGeom prst="rect">
-            <a:avLst/>
-          </a:prstGeom>
-          <a:ln w="19050">
-            <a:solidFill>
-              <a:schemeClr val="accent3"/>
-            </a:solidFill>
-          </a:ln>
-          <a:effectLst/>
-        </p:spPr>
-        <p:style>
-          <a:lnRef idx="1">
-            <a:schemeClr val="accent3"/>
-          </a:lnRef>
-          <a:fillRef idx="2">
-            <a:schemeClr val="accent3"/>
-          </a:fillRef>
-          <a:effectRef idx="1">
-            <a:schemeClr val="accent3"/>
-          </a:effectRef>
-          <a:fontRef idx="minor">
-            <a:schemeClr val="dk1"/>
-          </a:fontRef>
-        </p:style>
-        <p:txBody>
-          <a:bodyPr rtlCol="0" anchor="ctr"/>
-          <a:lstStyle/>
-          <a:p>
-            <a:pPr algn="ctr"/>
-            <a:r>
-              <a:rPr lang="en-US" sz="1050" b="1" dirty="0" err="1">
-                <a:solidFill>
-                  <a:schemeClr val="accent3">
-                    <a:lumMod val="75000"/>
-                  </a:schemeClr>
-                </a:solidFill>
-              </a:rPr>
-              <a:t>HelpWindow</a:t>
-            </a:r>
-            <a:endParaRPr lang="en-SG" sz="1050" b="1" dirty="0">
-              <a:solidFill>
-                <a:schemeClr val="accent3">
-                  <a:lumMod val="75000"/>
-                </a:schemeClr>
-              </a:solidFill>
-            </a:endParaRPr>
-          </a:p>
-        </p:txBody>
-      </p:sp>
-      <p:sp>
-        <p:nvSpPr>
           <p:cNvPr id="39" name="Flowchart: Decision 38"/>
           <p:cNvSpPr/>
           <p:nvPr/>
@@ -4392,7 +4392,7 @@
           <a:p>
             <a:pPr algn="ctr"/>
             <a:r>
-              <a:rPr lang="en-US" sz="1050" b="1" dirty="0" err="1">
+              <a:rPr lang="en-US" sz="1050" b="1" dirty="0">
                 <a:solidFill>
                   <a:schemeClr val="accent3">
                     <a:lumMod val="75000"/>
@@ -4634,7 +4634,7 @@
               </a:rPr>
             </a:br>
             <a:r>
-              <a:rPr lang="en-US" sz="1050" b="1" dirty="0" err="1">
+              <a:rPr lang="en-US" sz="1050" b="1" dirty="0">
                 <a:solidFill>
                   <a:schemeClr val="accent3">
                     <a:lumMod val="75000"/>
@@ -4985,14 +4985,14 @@
           <a:p>
             <a:pPr algn="ctr"/>
             <a:r>
-              <a:rPr lang="en-US" sz="1100" b="1" dirty="0">
+              <a:rPr lang="en-US" sz="1100" b="1">
                 <a:solidFill>
                   <a:schemeClr val="bg1"/>
                 </a:solidFill>
               </a:rPr>
               <a:t>Model</a:t>
             </a:r>
-            <a:endParaRPr lang="en-SG" sz="1100" b="1" dirty="0">
+            <a:endParaRPr lang="en-SG" sz="1100" b="1">
               <a:solidFill>
                 <a:schemeClr val="bg1"/>
               </a:solidFill>
@@ -5055,7 +5055,7 @@
           <a:p>
             <a:pPr algn="ctr"/>
             <a:r>
-              <a:rPr lang="en-US" sz="1050" dirty="0" err="1">
+              <a:rPr lang="en-US" sz="1050" dirty="0">
                 <a:solidFill>
                   <a:schemeClr val="bg1"/>
                 </a:solidFill>
@@ -5727,7 +5727,7 @@
           <a:p>
             <a:pPr algn="ctr"/>
             <a:r>
-              <a:rPr lang="en-US" sz="1050" b="1" dirty="0" err="1">
+              <a:rPr lang="en-US" sz="1050" b="1" dirty="0">
                 <a:solidFill>
                   <a:schemeClr val="accent3">
                     <a:lumMod val="75000"/>
@@ -5787,7 +5787,7 @@
           <a:p>
             <a:pPr algn="ctr"/>
             <a:r>
-              <a:rPr lang="en-US" sz="1050" b="1" dirty="0" err="1">
+              <a:rPr lang="en-US" sz="1050" b="1" dirty="0">
                 <a:solidFill>
                   <a:schemeClr val="accent3">
                     <a:lumMod val="75000"/>
@@ -5850,7 +5850,7 @@
           <a:p>
             <a:pPr algn="ctr"/>
             <a:r>
-              <a:rPr lang="en-US" sz="1050" dirty="0" err="1">
+              <a:rPr lang="en-US" sz="1050" dirty="0">
                 <a:solidFill>
                   <a:schemeClr val="bg1"/>
                 </a:solidFill>
@@ -5948,7 +5948,7 @@
           <a:lstStyle/>
           <a:p>
             <a:pPr algn="ctr"/>
-            <a:endParaRPr lang="en-SG" sz="1050" b="1">
+            <a:endParaRPr lang="en-SG" sz="1050" b="1" dirty="0">
               <a:solidFill>
                 <a:srgbClr val="92D050"/>
               </a:solidFill>
@@ -6100,7 +6100,7 @@
           <a:p>
             <a:pPr algn="ctr"/>
             <a:r>
-              <a:rPr lang="en-US" sz="1050" b="1" dirty="0" err="1">
+              <a:rPr lang="en-US" sz="1050" b="1" dirty="0">
                 <a:solidFill>
                   <a:schemeClr val="accent3">
                     <a:lumMod val="75000"/>
@@ -6160,7 +6160,7 @@
           <a:p>
             <a:pPr algn="ctr"/>
             <a:r>
-              <a:rPr lang="en-US" sz="1050" b="1" dirty="0" err="1">
+              <a:rPr lang="en-US" sz="1050" b="1" dirty="0">
                 <a:solidFill>
                   <a:schemeClr val="accent3">
                     <a:lumMod val="75000"/>
@@ -6280,7 +6280,7 @@
           <a:p>
             <a:pPr algn="ctr"/>
             <a:r>
-              <a:rPr lang="en-US" sz="1050" b="1" dirty="0" err="1">
+              <a:rPr lang="en-US" sz="1050" b="1" dirty="0">
                 <a:solidFill>
                   <a:schemeClr val="accent3">
                     <a:lumMod val="75000"/>
@@ -6343,7 +6343,7 @@
           <a:lstStyle/>
           <a:p>
             <a:pPr algn="ctr"/>
-            <a:endParaRPr lang="en-SG"/>
+            <a:endParaRPr lang="en-SG" dirty="0"/>
           </a:p>
         </p:txBody>
       </p:sp>
@@ -6429,7 +6429,7 @@
           <a:p>
             <a:pPr algn="ctr"/>
             <a:r>
-              <a:rPr lang="en-US" sz="1050" b="1" dirty="0" err="1">
+              <a:rPr lang="en-US" sz="1050" b="1" dirty="0">
                 <a:solidFill>
                   <a:schemeClr val="accent3">
                     <a:lumMod val="75000"/>
@@ -6674,7 +6674,7 @@
               </a:rPr>
             </a:br>
             <a:r>
-              <a:rPr lang="en-US" sz="1050" b="1" dirty="0" err="1">
+              <a:rPr lang="en-US" sz="1050" b="1" dirty="0">
                 <a:solidFill>
                   <a:schemeClr val="accent3">
                     <a:lumMod val="75000"/>
@@ -7055,7 +7055,7 @@
           <a:p>
             <a:pPr algn="ctr"/>
             <a:r>
-              <a:rPr lang="en-US" sz="1050" dirty="0" err="1">
+              <a:rPr lang="en-US" sz="1050" dirty="0">
                 <a:solidFill>
                   <a:schemeClr val="bg1"/>
                 </a:solidFill>
@@ -7110,7 +7110,7 @@
           <a:lstStyle/>
           <a:p>
             <a:pPr algn="ctr"/>
-            <a:endParaRPr lang="en-SG" sz="1050" b="1">
+            <a:endParaRPr lang="en-SG" sz="1050" b="1" dirty="0">
               <a:solidFill>
                 <a:srgbClr val="92D050"/>
               </a:solidFill>
@@ -7333,7 +7333,7 @@
           <a:lstStyle/>
           <a:p>
             <a:pPr algn="ctr"/>
-            <a:endParaRPr lang="en-SG"/>
+            <a:endParaRPr lang="en-SG" dirty="0"/>
           </a:p>
         </p:txBody>
       </p:sp>
@@ -7415,7 +7415,7 @@
           <a:lstStyle/>
           <a:p>
             <a:pPr algn="ctr"/>
-            <a:endParaRPr lang="en-SG"/>
+            <a:endParaRPr lang="en-SG" dirty="0"/>
           </a:p>
         </p:txBody>
       </p:sp>
@@ -7532,7 +7532,7 @@
           <a:p>
             <a:pPr algn="ctr"/>
             <a:r>
-              <a:rPr lang="en-US" sz="1050" b="1" dirty="0" err="1">
+              <a:rPr lang="en-US" sz="1050" b="1" dirty="0">
                 <a:solidFill>
                   <a:schemeClr val="accent3">
                     <a:lumMod val="75000"/>
@@ -7598,7 +7598,7 @@
           <a:p>
             <a:pPr algn="ctr"/>
             <a:r>
-              <a:rPr lang="en-US" sz="1050" b="1" dirty="0" err="1">
+              <a:rPr lang="en-US" sz="1050" b="1" dirty="0">
                 <a:solidFill>
                   <a:schemeClr val="accent3">
                     <a:lumMod val="75000"/>
@@ -7664,7 +7664,7 @@
           <a:p>
             <a:pPr algn="ctr"/>
             <a:r>
-              <a:rPr lang="en-US" sz="1050" b="1" dirty="0" err="1">
+              <a:rPr lang="en-US" sz="1050" b="1" dirty="0">
                 <a:solidFill>
                   <a:schemeClr val="accent3">
                     <a:lumMod val="75000"/>
@@ -7730,7 +7730,7 @@
           <a:p>
             <a:pPr algn="ctr"/>
             <a:r>
-              <a:rPr lang="en-US" sz="1050" b="1" dirty="0" err="1">
+              <a:rPr lang="en-US" sz="1050" b="1" dirty="0">
                 <a:solidFill>
                   <a:schemeClr val="accent3">
                     <a:lumMod val="75000"/>
@@ -7796,7 +7796,7 @@
           <a:p>
             <a:pPr algn="ctr"/>
             <a:r>
-              <a:rPr lang="en-US" sz="1050" b="1" dirty="0" err="1">
+              <a:rPr lang="en-US" sz="1050" b="1" dirty="0">
                 <a:solidFill>
                   <a:schemeClr val="accent3">
                     <a:lumMod val="75000"/>
@@ -7862,7 +7862,7 @@
           <a:p>
             <a:pPr algn="ctr"/>
             <a:r>
-              <a:rPr lang="en-US" sz="1050" b="1" dirty="0" err="1">
+              <a:rPr lang="en-US" sz="1050" b="1" dirty="0">
                 <a:solidFill>
                   <a:schemeClr val="accent3">
                     <a:lumMod val="75000"/>
@@ -8082,18 +8082,19 @@
           </p:cNvPr>
           <p:cNvCxnSpPr>
             <a:cxnSpLocks/>
-            <a:stCxn id="48" idx="2"/>
             <a:endCxn id="52" idx="1"/>
           </p:cNvCxnSpPr>
           <p:nvPr/>
         </p:nvCxnSpPr>
         <p:spPr>
-          <a:xfrm rot="16200000" flipH="1">
-            <a:off x="4534906" y="4549270"/>
-            <a:ext cx="271101" cy="621360"/>
-          </a:xfrm>
-          <a:prstGeom prst="bentConnector2">
-            <a:avLst/>
+          <a:xfrm>
+            <a:off x="4183878" y="4877082"/>
+            <a:ext cx="797258" cy="118419"/>
+          </a:xfrm>
+          <a:prstGeom prst="bentConnector3">
+            <a:avLst>
+              <a:gd name="adj1" fmla="val 50000"/>
+            </a:avLst>
           </a:prstGeom>
           <a:ln w="19050">
             <a:solidFill>
@@ -8483,7 +8484,7 @@
           <a:lstStyle/>
           <a:p>
             <a:pPr algn="ctr"/>
-            <a:endParaRPr lang="en-SG"/>
+            <a:endParaRPr lang="en-SG" dirty="0"/>
           </a:p>
         </p:txBody>
       </p:sp>
@@ -8571,7 +8572,7 @@
           <a:lstStyle/>
           <a:p>
             <a:pPr algn="ctr"/>
-            <a:endParaRPr lang="en-SG"/>
+            <a:endParaRPr lang="en-SG" dirty="0"/>
           </a:p>
         </p:txBody>
       </p:sp>
@@ -8659,7 +8660,7 @@
           <a:lstStyle/>
           <a:p>
             <a:pPr algn="ctr"/>
-            <a:endParaRPr lang="en-SG"/>
+            <a:endParaRPr lang="en-SG" dirty="0"/>
           </a:p>
         </p:txBody>
       </p:sp>
@@ -8747,7 +8748,7 @@
           <a:lstStyle/>
           <a:p>
             <a:pPr algn="ctr"/>
-            <a:endParaRPr lang="en-SG"/>
+            <a:endParaRPr lang="en-SG" dirty="0"/>
           </a:p>
         </p:txBody>
       </p:sp>

</xml_diff>